<commit_message>
Update Predicting daily Surgery Volume at Vanderbilt University Medical Center.pptx
</commit_message>
<xml_diff>
--- a/Predicting daily Surgery Volume at Vanderbilt University Medical Center.pptx
+++ b/Predicting daily Surgery Volume at Vanderbilt University Medical Center.pptx
@@ -15116,20 +15116,12 @@
           <a:lstStyle/>
           <a:p>
             <a:r>
-              <a:rPr lang="en-US" dirty="0"/>
-              <a:t>Shubham Goswami	</a:t>
+              <a:rPr lang="en-US"/>
+              <a:t>Vigneshwaran </a:t>
             </a:r>
-          </a:p>
-          <a:p>
             <a:r>
               <a:rPr lang="en-US" dirty="0"/>
-              <a:t>Sujin Park</a:t>
-            </a:r>
-          </a:p>
-          <a:p>
-            <a:r>
-              <a:rPr lang="en-US" dirty="0"/>
-              <a:t>Vigneshwaran Giri Velumani</a:t>
+              <a:t>Giri Velumani</a:t>
             </a:r>
           </a:p>
         </p:txBody>

</xml_diff>